<commit_message>
Added R in Action Slides
</commit_message>
<xml_diff>
--- a/AxisAndAlliesOdds/AxisAndAllies.pptx
+++ b/AxisAndAlliesOdds/AxisAndAllies.pptx
@@ -289,7 +289,7 @@
           <a:p>
             <a:fld id="{740113AD-B5C0-482D-A34F-82E0BFE146EC}" type="datetimeFigureOut">
               <a:rPr lang="en-US" smtClean="0"/>
-              <a:t>12/4/2019</a:t>
+              <a:t>12/5/2019</a:t>
             </a:fld>
             <a:endParaRPr lang="en-US"/>
           </a:p>
@@ -459,7 +459,7 @@
           <a:p>
             <a:fld id="{740113AD-B5C0-482D-A34F-82E0BFE146EC}" type="datetimeFigureOut">
               <a:rPr lang="en-US" smtClean="0"/>
-              <a:t>12/4/2019</a:t>
+              <a:t>12/5/2019</a:t>
             </a:fld>
             <a:endParaRPr lang="en-US"/>
           </a:p>
@@ -639,7 +639,7 @@
           <a:p>
             <a:fld id="{740113AD-B5C0-482D-A34F-82E0BFE146EC}" type="datetimeFigureOut">
               <a:rPr lang="en-US" smtClean="0"/>
-              <a:t>12/4/2019</a:t>
+              <a:t>12/5/2019</a:t>
             </a:fld>
             <a:endParaRPr lang="en-US"/>
           </a:p>
@@ -809,7 +809,7 @@
           <a:p>
             <a:fld id="{740113AD-B5C0-482D-A34F-82E0BFE146EC}" type="datetimeFigureOut">
               <a:rPr lang="en-US" smtClean="0"/>
-              <a:t>12/4/2019</a:t>
+              <a:t>12/5/2019</a:t>
             </a:fld>
             <a:endParaRPr lang="en-US"/>
           </a:p>
@@ -1077,7 +1077,7 @@
           <a:p>
             <a:fld id="{740113AD-B5C0-482D-A34F-82E0BFE146EC}" type="datetimeFigureOut">
               <a:rPr lang="en-US" smtClean="0"/>
-              <a:t>12/4/2019</a:t>
+              <a:t>12/5/2019</a:t>
             </a:fld>
             <a:endParaRPr lang="en-US"/>
           </a:p>
@@ -1309,7 +1309,7 @@
           <a:p>
             <a:fld id="{740113AD-B5C0-482D-A34F-82E0BFE146EC}" type="datetimeFigureOut">
               <a:rPr lang="en-US" smtClean="0"/>
-              <a:t>12/4/2019</a:t>
+              <a:t>12/5/2019</a:t>
             </a:fld>
             <a:endParaRPr lang="en-US"/>
           </a:p>
@@ -1668,7 +1668,7 @@
           <a:p>
             <a:fld id="{740113AD-B5C0-482D-A34F-82E0BFE146EC}" type="datetimeFigureOut">
               <a:rPr lang="en-US" smtClean="0"/>
-              <a:t>12/4/2019</a:t>
+              <a:t>12/5/2019</a:t>
             </a:fld>
             <a:endParaRPr lang="en-US"/>
           </a:p>
@@ -1809,7 +1809,7 @@
           <a:p>
             <a:fld id="{740113AD-B5C0-482D-A34F-82E0BFE146EC}" type="datetimeFigureOut">
               <a:rPr lang="en-US" smtClean="0"/>
-              <a:t>12/4/2019</a:t>
+              <a:t>12/5/2019</a:t>
             </a:fld>
             <a:endParaRPr lang="en-US"/>
           </a:p>
@@ -1904,7 +1904,7 @@
           <a:p>
             <a:fld id="{740113AD-B5C0-482D-A34F-82E0BFE146EC}" type="datetimeFigureOut">
               <a:rPr lang="en-US" smtClean="0"/>
-              <a:t>12/4/2019</a:t>
+              <a:t>12/5/2019</a:t>
             </a:fld>
             <a:endParaRPr lang="en-US"/>
           </a:p>
@@ -2261,7 +2261,7 @@
           <a:p>
             <a:fld id="{740113AD-B5C0-482D-A34F-82E0BFE146EC}" type="datetimeFigureOut">
               <a:rPr lang="en-US" smtClean="0"/>
-              <a:t>12/4/2019</a:t>
+              <a:t>12/5/2019</a:t>
             </a:fld>
             <a:endParaRPr lang="en-US"/>
           </a:p>
@@ -2618,7 +2618,7 @@
           <a:p>
             <a:fld id="{740113AD-B5C0-482D-A34F-82E0BFE146EC}" type="datetimeFigureOut">
               <a:rPr lang="en-US" smtClean="0"/>
-              <a:t>12/4/2019</a:t>
+              <a:t>12/5/2019</a:t>
             </a:fld>
             <a:endParaRPr lang="en-US"/>
           </a:p>
@@ -2859,7 +2859,7 @@
           <a:p>
             <a:fld id="{740113AD-B5C0-482D-A34F-82E0BFE146EC}" type="datetimeFigureOut">
               <a:rPr lang="en-US" smtClean="0"/>
-              <a:t>12/4/2019</a:t>
+              <a:t>12/5/2019</a:t>
             </a:fld>
             <a:endParaRPr lang="en-US"/>
           </a:p>
@@ -5495,25 +5495,25 @@
           <a:p>
             <a:r>
               <a:rPr lang="en-US" sz="2800" dirty="0"/>
-              <a:t>Battle Board</a:t>
+              <a:t>Axis and Allies Battle Board</a:t>
             </a:r>
           </a:p>
           <a:p>
             <a:r>
               <a:rPr lang="en-US" sz="2800" dirty="0"/>
-              <a:t>An Example Battle</a:t>
+              <a:t>Example of a Battle</a:t>
             </a:r>
           </a:p>
           <a:p>
             <a:r>
               <a:rPr lang="en-US" sz="2800" dirty="0"/>
-              <a:t>Unit Dice Roll Hit Distributions</a:t>
+              <a:t>Dice Roll Hit Distribution</a:t>
             </a:r>
           </a:p>
           <a:p>
             <a:r>
               <a:rPr lang="en-US" sz="2800" dirty="0"/>
-              <a:t>Attacker X Defender Outcomes</a:t>
+              <a:t>One Round Outcomes Explained</a:t>
             </a:r>
           </a:p>
           <a:p>
@@ -5525,19 +5525,19 @@
           <a:p>
             <a:r>
               <a:rPr lang="en-US" sz="2800" dirty="0"/>
-              <a:t>Exact Outcome Animation</a:t>
+              <a:t>Exact Outcome Animation (Full Battle)</a:t>
             </a:r>
           </a:p>
           <a:p>
             <a:r>
               <a:rPr lang="en-US" sz="2800" dirty="0"/>
-              <a:t>Simulation Animation</a:t>
+              <a:t>Simulated Outcome Animation</a:t>
             </a:r>
           </a:p>
           <a:p>
             <a:r>
               <a:rPr lang="en-US" sz="2800" dirty="0"/>
-              <a:t>Simulation Code</a:t>
+              <a:t>Simulation Outcome Code</a:t>
             </a:r>
           </a:p>
         </p:txBody>

</xml_diff>